<commit_message>
Adjustments to Orientation/Layout and Screen Flow slides
</commit_message>
<xml_diff>
--- a/ForkandPotatoUI.pptx
+++ b/ForkandPotatoUI.pptx
@@ -127,6 +127,10 @@
 </p:presentation>
 </file>
 
+<file path=ppt/revisionInfo.xml><?xml version="1.0" encoding="utf-8"?>
+<p1510:revInfo xmlns:a="http://schemas.openxmlformats.org/drawingml/2006/main" xmlns:r="http://schemas.openxmlformats.org/officeDocument/2006/relationships" xmlns:p1510="http://schemas.microsoft.com/office/powerpoint/2015/10/main"/>
+</file>
+
 <file path=ppt/notesMasters/notesMaster1.xml><?xml version="1.0" encoding="utf-8"?>
 <p:notesMaster xmlns:a="http://schemas.openxmlformats.org/drawingml/2006/main" xmlns:r="http://schemas.openxmlformats.org/officeDocument/2006/relationships" xmlns:p="http://schemas.openxmlformats.org/presentationml/2006/main">
   <p:cSld>
@@ -273,38 +277,37 @@
           <a:p>
             <a:pPr lvl="0"/>
             <a:r>
-              <a:rPr lang="en-US" smtClean="0"/>
+              <a:rPr lang="en-US"/>
               <a:t>Click to edit Master text styles</a:t>
             </a:r>
           </a:p>
           <a:p>
             <a:pPr lvl="1"/>
             <a:r>
-              <a:rPr lang="en-US" smtClean="0"/>
+              <a:rPr lang="en-US"/>
               <a:t>Second level</a:t>
             </a:r>
           </a:p>
           <a:p>
             <a:pPr lvl="2"/>
             <a:r>
-              <a:rPr lang="en-US" smtClean="0"/>
+              <a:rPr lang="en-US"/>
               <a:t>Third level</a:t>
             </a:r>
           </a:p>
           <a:p>
             <a:pPr lvl="3"/>
             <a:r>
-              <a:rPr lang="en-US" smtClean="0"/>
+              <a:rPr lang="en-US"/>
               <a:t>Fourth level</a:t>
             </a:r>
           </a:p>
           <a:p>
             <a:pPr lvl="4"/>
             <a:r>
-              <a:rPr lang="en-US" smtClean="0"/>
+              <a:rPr lang="en-US"/>
               <a:t>Fifth level</a:t>
             </a:r>
-            <a:endParaRPr lang="en-US"/>
           </a:p>
         </p:txBody>
       </p:sp>
@@ -643,7 +646,7 @@
           </a:lstStyle>
           <a:p>
             <a:r>
-              <a:rPr lang="en-US" smtClean="0"/>
+              <a:rPr lang="en-US"/>
               <a:t>Click to edit Master title style</a:t>
             </a:r>
             <a:endParaRPr lang="en-US" dirty="0"/>
@@ -723,7 +726,7 @@
           </a:lstStyle>
           <a:p>
             <a:r>
-              <a:rPr lang="en-US" smtClean="0"/>
+              <a:rPr lang="en-US"/>
               <a:t>Click to edit Master subtitle style</a:t>
             </a:r>
             <a:endParaRPr lang="en-US" dirty="0"/>
@@ -880,7 +883,7 @@
           <a:lstStyle/>
           <a:p>
             <a:r>
-              <a:rPr lang="en-US" smtClean="0"/>
+              <a:rPr lang="en-US"/>
               <a:t>Click to edit Master title style</a:t>
             </a:r>
             <a:endParaRPr lang="en-US" dirty="0"/>
@@ -904,35 +907,35 @@
           <a:p>
             <a:pPr lvl="0"/>
             <a:r>
-              <a:rPr lang="en-US" smtClean="0"/>
+              <a:rPr lang="en-US"/>
               <a:t>Click to edit Master text styles</a:t>
             </a:r>
           </a:p>
           <a:p>
             <a:pPr lvl="1"/>
             <a:r>
-              <a:rPr lang="en-US" smtClean="0"/>
+              <a:rPr lang="en-US"/>
               <a:t>Second level</a:t>
             </a:r>
           </a:p>
           <a:p>
             <a:pPr lvl="2"/>
             <a:r>
-              <a:rPr lang="en-US" smtClean="0"/>
+              <a:rPr lang="en-US"/>
               <a:t>Third level</a:t>
             </a:r>
           </a:p>
           <a:p>
             <a:pPr lvl="3"/>
             <a:r>
-              <a:rPr lang="en-US" smtClean="0"/>
+              <a:rPr lang="en-US"/>
               <a:t>Fourth level</a:t>
             </a:r>
           </a:p>
           <a:p>
             <a:pPr lvl="4"/>
             <a:r>
-              <a:rPr lang="en-US" smtClean="0"/>
+              <a:rPr lang="en-US"/>
               <a:t>Fifth level</a:t>
             </a:r>
             <a:endParaRPr lang="en-US" dirty="0"/>
@@ -1055,7 +1058,7 @@
           <a:lstStyle/>
           <a:p>
             <a:r>
-              <a:rPr lang="en-US" smtClean="0"/>
+              <a:rPr lang="en-US"/>
               <a:t>Click to edit Master title style</a:t>
             </a:r>
             <a:endParaRPr lang="en-US" dirty="0"/>
@@ -1084,35 +1087,35 @@
           <a:p>
             <a:pPr lvl="0"/>
             <a:r>
-              <a:rPr lang="en-US" smtClean="0"/>
+              <a:rPr lang="en-US"/>
               <a:t>Click to edit Master text styles</a:t>
             </a:r>
           </a:p>
           <a:p>
             <a:pPr lvl="1"/>
             <a:r>
-              <a:rPr lang="en-US" smtClean="0"/>
+              <a:rPr lang="en-US"/>
               <a:t>Second level</a:t>
             </a:r>
           </a:p>
           <a:p>
             <a:pPr lvl="2"/>
             <a:r>
-              <a:rPr lang="en-US" smtClean="0"/>
+              <a:rPr lang="en-US"/>
               <a:t>Third level</a:t>
             </a:r>
           </a:p>
           <a:p>
             <a:pPr lvl="3"/>
             <a:r>
-              <a:rPr lang="en-US" smtClean="0"/>
+              <a:rPr lang="en-US"/>
               <a:t>Fourth level</a:t>
             </a:r>
           </a:p>
           <a:p>
             <a:pPr lvl="4"/>
             <a:r>
-              <a:rPr lang="en-US" smtClean="0"/>
+              <a:rPr lang="en-US"/>
               <a:t>Fifth level</a:t>
             </a:r>
             <a:endParaRPr lang="en-US" dirty="0"/>
@@ -1265,7 +1268,7 @@
           <a:lstStyle/>
           <a:p>
             <a:r>
-              <a:rPr lang="en-US" smtClean="0"/>
+              <a:rPr lang="en-US"/>
               <a:t>Click to edit Master title style</a:t>
             </a:r>
             <a:endParaRPr lang="en-US" dirty="0"/>
@@ -1289,35 +1292,35 @@
           <a:p>
             <a:pPr lvl="0"/>
             <a:r>
-              <a:rPr lang="en-US" smtClean="0"/>
+              <a:rPr lang="en-US"/>
               <a:t>Click to edit Master text styles</a:t>
             </a:r>
           </a:p>
           <a:p>
             <a:pPr lvl="1"/>
             <a:r>
-              <a:rPr lang="en-US" smtClean="0"/>
+              <a:rPr lang="en-US"/>
               <a:t>Second level</a:t>
             </a:r>
           </a:p>
           <a:p>
             <a:pPr lvl="2"/>
             <a:r>
-              <a:rPr lang="en-US" smtClean="0"/>
+              <a:rPr lang="en-US"/>
               <a:t>Third level</a:t>
             </a:r>
           </a:p>
           <a:p>
             <a:pPr lvl="3"/>
             <a:r>
-              <a:rPr lang="en-US" smtClean="0"/>
+              <a:rPr lang="en-US"/>
               <a:t>Fourth level</a:t>
             </a:r>
           </a:p>
           <a:p>
             <a:pPr lvl="4"/>
             <a:r>
-              <a:rPr lang="en-US" smtClean="0"/>
+              <a:rPr lang="en-US"/>
               <a:t>Fifth level</a:t>
             </a:r>
             <a:endParaRPr lang="en-US" dirty="0"/>
@@ -1484,7 +1487,7 @@
           </a:lstStyle>
           <a:p>
             <a:r>
-              <a:rPr lang="en-US" smtClean="0"/>
+              <a:rPr lang="en-US"/>
               <a:t>Click to edit Master title style</a:t>
             </a:r>
             <a:endParaRPr lang="en-US" dirty="0"/>
@@ -1613,7 +1616,7 @@
           <a:p>
             <a:pPr lvl="0"/>
             <a:r>
-              <a:rPr lang="en-US" smtClean="0"/>
+              <a:rPr lang="en-US"/>
               <a:t>Click to edit Master text styles</a:t>
             </a:r>
           </a:p>
@@ -1770,7 +1773,7 @@
           <a:lstStyle/>
           <a:p>
             <a:r>
-              <a:rPr lang="en-US" smtClean="0"/>
+              <a:rPr lang="en-US"/>
               <a:t>Click to edit Master title style</a:t>
             </a:r>
             <a:endParaRPr lang="en-US" dirty="0"/>
@@ -1799,35 +1802,35 @@
           <a:p>
             <a:pPr lvl="0"/>
             <a:r>
-              <a:rPr lang="en-US" smtClean="0"/>
+              <a:rPr lang="en-US"/>
               <a:t>Click to edit Master text styles</a:t>
             </a:r>
           </a:p>
           <a:p>
             <a:pPr lvl="1"/>
             <a:r>
-              <a:rPr lang="en-US" smtClean="0"/>
+              <a:rPr lang="en-US"/>
               <a:t>Second level</a:t>
             </a:r>
           </a:p>
           <a:p>
             <a:pPr lvl="2"/>
             <a:r>
-              <a:rPr lang="en-US" smtClean="0"/>
+              <a:rPr lang="en-US"/>
               <a:t>Third level</a:t>
             </a:r>
           </a:p>
           <a:p>
             <a:pPr lvl="3"/>
             <a:r>
-              <a:rPr lang="en-US" smtClean="0"/>
+              <a:rPr lang="en-US"/>
               <a:t>Fourth level</a:t>
             </a:r>
           </a:p>
           <a:p>
             <a:pPr lvl="4"/>
             <a:r>
-              <a:rPr lang="en-US" smtClean="0"/>
+              <a:rPr lang="en-US"/>
               <a:t>Fifth level</a:t>
             </a:r>
             <a:endParaRPr lang="en-US" dirty="0"/>
@@ -1856,35 +1859,35 @@
           <a:p>
             <a:pPr lvl="0"/>
             <a:r>
-              <a:rPr lang="en-US" smtClean="0"/>
+              <a:rPr lang="en-US"/>
               <a:t>Click to edit Master text styles</a:t>
             </a:r>
           </a:p>
           <a:p>
             <a:pPr lvl="1"/>
             <a:r>
-              <a:rPr lang="en-US" smtClean="0"/>
+              <a:rPr lang="en-US"/>
               <a:t>Second level</a:t>
             </a:r>
           </a:p>
           <a:p>
             <a:pPr lvl="2"/>
             <a:r>
-              <a:rPr lang="en-US" smtClean="0"/>
+              <a:rPr lang="en-US"/>
               <a:t>Third level</a:t>
             </a:r>
           </a:p>
           <a:p>
             <a:pPr lvl="3"/>
             <a:r>
-              <a:rPr lang="en-US" smtClean="0"/>
+              <a:rPr lang="en-US"/>
               <a:t>Fourth level</a:t>
             </a:r>
           </a:p>
           <a:p>
             <a:pPr lvl="4"/>
             <a:r>
-              <a:rPr lang="en-US" smtClean="0"/>
+              <a:rPr lang="en-US"/>
               <a:t>Fifth level</a:t>
             </a:r>
             <a:endParaRPr lang="en-US" dirty="0"/>
@@ -2007,7 +2010,7 @@
           <a:lstStyle/>
           <a:p>
             <a:r>
-              <a:rPr lang="en-US" smtClean="0"/>
+              <a:rPr lang="en-US"/>
               <a:t>Click to edit Master title style</a:t>
             </a:r>
             <a:endParaRPr lang="en-US" dirty="0"/>
@@ -2088,7 +2091,7 @@
           <a:p>
             <a:pPr lvl="0"/>
             <a:r>
-              <a:rPr lang="en-US" smtClean="0"/>
+              <a:rPr lang="en-US"/>
               <a:t>Click to edit Master text styles</a:t>
             </a:r>
           </a:p>
@@ -2116,35 +2119,35 @@
           <a:p>
             <a:pPr lvl="0"/>
             <a:r>
-              <a:rPr lang="en-US" smtClean="0"/>
+              <a:rPr lang="en-US"/>
               <a:t>Click to edit Master text styles</a:t>
             </a:r>
           </a:p>
           <a:p>
             <a:pPr lvl="1"/>
             <a:r>
-              <a:rPr lang="en-US" smtClean="0"/>
+              <a:rPr lang="en-US"/>
               <a:t>Second level</a:t>
             </a:r>
           </a:p>
           <a:p>
             <a:pPr lvl="2"/>
             <a:r>
-              <a:rPr lang="en-US" smtClean="0"/>
+              <a:rPr lang="en-US"/>
               <a:t>Third level</a:t>
             </a:r>
           </a:p>
           <a:p>
             <a:pPr lvl="3"/>
             <a:r>
-              <a:rPr lang="en-US" smtClean="0"/>
+              <a:rPr lang="en-US"/>
               <a:t>Fourth level</a:t>
             </a:r>
           </a:p>
           <a:p>
             <a:pPr lvl="4"/>
             <a:r>
-              <a:rPr lang="en-US" smtClean="0"/>
+              <a:rPr lang="en-US"/>
               <a:t>Fifth level</a:t>
             </a:r>
             <a:endParaRPr lang="en-US" dirty="0"/>
@@ -2235,7 +2238,7 @@
               <a:buNone/>
             </a:pPr>
             <a:r>
-              <a:rPr lang="en-US" smtClean="0"/>
+              <a:rPr lang="en-US"/>
               <a:t>Click to edit Master text styles</a:t>
             </a:r>
           </a:p>
@@ -2263,35 +2266,35 @@
           <a:p>
             <a:pPr lvl="0"/>
             <a:r>
-              <a:rPr lang="en-US" smtClean="0"/>
+              <a:rPr lang="en-US"/>
               <a:t>Click to edit Master text styles</a:t>
             </a:r>
           </a:p>
           <a:p>
             <a:pPr lvl="1"/>
             <a:r>
-              <a:rPr lang="en-US" smtClean="0"/>
+              <a:rPr lang="en-US"/>
               <a:t>Second level</a:t>
             </a:r>
           </a:p>
           <a:p>
             <a:pPr lvl="2"/>
             <a:r>
-              <a:rPr lang="en-US" smtClean="0"/>
+              <a:rPr lang="en-US"/>
               <a:t>Third level</a:t>
             </a:r>
           </a:p>
           <a:p>
             <a:pPr lvl="3"/>
             <a:r>
-              <a:rPr lang="en-US" smtClean="0"/>
+              <a:rPr lang="en-US"/>
               <a:t>Fourth level</a:t>
             </a:r>
           </a:p>
           <a:p>
             <a:pPr lvl="4"/>
             <a:r>
-              <a:rPr lang="en-US" smtClean="0"/>
+              <a:rPr lang="en-US"/>
               <a:t>Fifth level</a:t>
             </a:r>
             <a:endParaRPr lang="en-US" dirty="0"/>
@@ -2409,7 +2412,7 @@
           <a:lstStyle/>
           <a:p>
             <a:r>
-              <a:rPr lang="en-US" smtClean="0"/>
+              <a:rPr lang="en-US"/>
               <a:t>Click to edit Master title style</a:t>
             </a:r>
             <a:endParaRPr lang="en-US" dirty="0"/>
@@ -2636,7 +2639,7 @@
           </a:lstStyle>
           <a:p>
             <a:r>
-              <a:rPr lang="en-US" smtClean="0"/>
+              <a:rPr lang="en-US"/>
               <a:t>Click to edit Master title style</a:t>
             </a:r>
             <a:endParaRPr lang="en-US" dirty="0"/>
@@ -2693,35 +2696,35 @@
           <a:p>
             <a:pPr lvl="0"/>
             <a:r>
-              <a:rPr lang="en-US" smtClean="0"/>
+              <a:rPr lang="en-US"/>
               <a:t>Click to edit Master text styles</a:t>
             </a:r>
           </a:p>
           <a:p>
             <a:pPr lvl="1"/>
             <a:r>
-              <a:rPr lang="en-US" smtClean="0"/>
+              <a:rPr lang="en-US"/>
               <a:t>Second level</a:t>
             </a:r>
           </a:p>
           <a:p>
             <a:pPr lvl="2"/>
             <a:r>
-              <a:rPr lang="en-US" smtClean="0"/>
+              <a:rPr lang="en-US"/>
               <a:t>Third level</a:t>
             </a:r>
           </a:p>
           <a:p>
             <a:pPr lvl="3"/>
             <a:r>
-              <a:rPr lang="en-US" smtClean="0"/>
+              <a:rPr lang="en-US"/>
               <a:t>Fourth level</a:t>
             </a:r>
           </a:p>
           <a:p>
             <a:pPr lvl="4"/>
             <a:r>
-              <a:rPr lang="en-US" smtClean="0"/>
+              <a:rPr lang="en-US"/>
               <a:t>Fifth level</a:t>
             </a:r>
             <a:endParaRPr lang="en-US" dirty="0"/>
@@ -2795,7 +2798,7 @@
           <a:p>
             <a:pPr lvl="0"/>
             <a:r>
-              <a:rPr lang="en-US" smtClean="0"/>
+              <a:rPr lang="en-US"/>
               <a:t>Click to edit Master text styles</a:t>
             </a:r>
           </a:p>
@@ -2923,7 +2926,7 @@
           </a:lstStyle>
           <a:p>
             <a:r>
-              <a:rPr lang="en-US" smtClean="0"/>
+              <a:rPr lang="en-US"/>
               <a:t>Click to edit Master title style</a:t>
             </a:r>
             <a:endParaRPr lang="en-US" dirty="0"/>
@@ -2994,7 +2997,7 @@
           </a:lstStyle>
           <a:p>
             <a:r>
-              <a:rPr lang="en-US" smtClean="0"/>
+              <a:rPr lang="en-US"/>
               <a:t>Click icon to add picture</a:t>
             </a:r>
             <a:endParaRPr lang="en-US" dirty="0"/>
@@ -3075,7 +3078,7 @@
           <a:p>
             <a:pPr lvl="0"/>
             <a:r>
-              <a:rPr lang="en-US" smtClean="0"/>
+              <a:rPr lang="en-US"/>
               <a:t>Click to edit Master text styles</a:t>
             </a:r>
           </a:p>
@@ -3245,7 +3248,7 @@
           <a:lstStyle/>
           <a:p>
             <a:r>
-              <a:rPr lang="en-US" smtClean="0"/>
+              <a:rPr lang="en-US"/>
               <a:t>Click to edit Master title style</a:t>
             </a:r>
             <a:endParaRPr lang="en-US" dirty="0"/>
@@ -3279,35 +3282,35 @@
           <a:p>
             <a:pPr lvl="0"/>
             <a:r>
-              <a:rPr lang="en-US" smtClean="0"/>
+              <a:rPr lang="en-US"/>
               <a:t>Click to edit Master text styles</a:t>
             </a:r>
           </a:p>
           <a:p>
             <a:pPr lvl="1"/>
             <a:r>
-              <a:rPr lang="en-US" smtClean="0"/>
+              <a:rPr lang="en-US"/>
               <a:t>Second level</a:t>
             </a:r>
           </a:p>
           <a:p>
             <a:pPr lvl="2"/>
             <a:r>
-              <a:rPr lang="en-US" smtClean="0"/>
+              <a:rPr lang="en-US"/>
               <a:t>Third level</a:t>
             </a:r>
           </a:p>
           <a:p>
             <a:pPr lvl="3"/>
             <a:r>
-              <a:rPr lang="en-US" smtClean="0"/>
+              <a:rPr lang="en-US"/>
               <a:t>Fourth level</a:t>
             </a:r>
           </a:p>
           <a:p>
             <a:pPr lvl="4"/>
             <a:r>
-              <a:rPr lang="en-US" smtClean="0"/>
+              <a:rPr lang="en-US"/>
               <a:t>Fifth level</a:t>
             </a:r>
             <a:endParaRPr lang="en-US" dirty="0"/>
@@ -3916,10 +3919,9 @@
           <a:lstStyle/>
           <a:p>
             <a:r>
-              <a:rPr lang="en-US" dirty="0" smtClean="0"/>
+              <a:rPr lang="en-US" dirty="0"/>
               <a:t>Fork and Potato: The RPG</a:t>
             </a:r>
-            <a:endParaRPr lang="en-US" dirty="0"/>
           </a:p>
         </p:txBody>
       </p:sp>
@@ -3946,41 +3948,41 @@
           <a:lstStyle/>
           <a:p>
             <a:r>
-              <a:rPr lang="en-US" sz="2000" b="1" dirty="0" smtClean="0"/>
+              <a:rPr lang="en-US" sz="2000" b="1" dirty="0"/>
               <a:t>Group 37</a:t>
             </a:r>
           </a:p>
           <a:p>
             <a:r>
-              <a:rPr lang="en-US" sz="2000" dirty="0" smtClean="0"/>
+              <a:rPr lang="en-US" sz="2000" dirty="0"/>
               <a:t>Nick Milton</a:t>
             </a:r>
           </a:p>
           <a:p>
             <a:r>
-              <a:rPr lang="en-US" sz="2000" dirty="0" smtClean="0"/>
+              <a:rPr lang="en-US" sz="2000" dirty="0"/>
               <a:t>Stephanie Reed</a:t>
             </a:r>
           </a:p>
           <a:p>
             <a:r>
-              <a:rPr lang="en-US" sz="2000" dirty="0" smtClean="0"/>
+              <a:rPr lang="en-US" sz="2000" dirty="0"/>
               <a:t>Simon Chen</a:t>
             </a:r>
           </a:p>
           <a:p>
             <a:r>
-              <a:rPr lang="en-US" sz="2000" dirty="0" smtClean="0"/>
+              <a:rPr lang="en-US" sz="2000" dirty="0"/>
               <a:t>Adam Shu</a:t>
             </a:r>
           </a:p>
           <a:p>
             <a:r>
-              <a:rPr lang="en-US" sz="2000" dirty="0" smtClean="0"/>
+              <a:rPr lang="en-US" sz="2000" dirty="0"/>
               <a:t>Sean </a:t>
             </a:r>
             <a:r>
-              <a:rPr lang="en-US" sz="2000" dirty="0" err="1" smtClean="0"/>
+              <a:rPr lang="en-US" sz="2000" dirty="0" err="1"/>
               <a:t>Miyaoka</a:t>
             </a:r>
             <a:endParaRPr lang="en-US" sz="2000" dirty="0"/>
@@ -4063,15 +4065,15 @@
           <a:lstStyle/>
           <a:p>
             <a:r>
-              <a:rPr lang="en-US" dirty="0" smtClean="0"/>
+              <a:rPr lang="en-US" dirty="0"/>
               <a:t>Wireframe </a:t>
             </a:r>
             <a:r>
-              <a:rPr lang="en-US" sz="3600" dirty="0" smtClean="0"/>
+              <a:rPr lang="en-US" sz="3600" dirty="0"/>
               <a:t>– </a:t>
             </a:r>
             <a:r>
-              <a:rPr lang="en-US" sz="3600" dirty="0" err="1" smtClean="0"/>
+              <a:rPr lang="en-US" sz="3600" dirty="0" err="1"/>
               <a:t>Battlescreens</a:t>
             </a:r>
             <a:endParaRPr lang="en-US" dirty="0"/>
@@ -4164,13 +4166,6 @@
   <p:clrMapOvr>
     <a:masterClrMapping/>
   </p:clrMapOvr>
-  <p:timing>
-    <p:tnLst>
-      <p:par>
-        <p:cTn id="1" dur="indefinite" restart="never" nodeType="tmRoot"/>
-      </p:par>
-    </p:tnLst>
-  </p:timing>
 </p:sld>
 </file>
 
@@ -4207,11 +4202,11 @@
           <a:lstStyle/>
           <a:p>
             <a:r>
-              <a:rPr lang="en-US" dirty="0" smtClean="0"/>
+              <a:rPr lang="en-US" dirty="0"/>
               <a:t>Wireframe </a:t>
             </a:r>
             <a:r>
-              <a:rPr lang="en-US" sz="3600" dirty="0" smtClean="0"/>
+              <a:rPr lang="en-US" sz="3600" dirty="0"/>
               <a:t>– Paused Overlay, Game Complete screen</a:t>
             </a:r>
             <a:endParaRPr lang="en-US" dirty="0"/>
@@ -4332,13 +4327,6 @@
   <p:clrMapOvr>
     <a:masterClrMapping/>
   </p:clrMapOvr>
-  <p:timing>
-    <p:tnLst>
-      <p:par>
-        <p:cTn id="1" dur="indefinite" restart="never" nodeType="tmRoot"/>
-      </p:par>
-    </p:tnLst>
-  </p:timing>
 </p:sld>
 </file>
 
@@ -6927,10 +6915,9 @@
           <a:lstStyle/>
           <a:p>
             <a:r>
-              <a:rPr lang="en-US" dirty="0" smtClean="0"/>
+              <a:rPr lang="en-US" dirty="0"/>
               <a:t>Fork and Potato: The RPG</a:t>
             </a:r>
-            <a:endParaRPr lang="en-US" dirty="0"/>
           </a:p>
         </p:txBody>
       </p:sp>
@@ -6957,41 +6944,41 @@
           <a:lstStyle/>
           <a:p>
             <a:r>
-              <a:rPr lang="en-US" sz="2000" b="1" dirty="0" smtClean="0"/>
+              <a:rPr lang="en-US" sz="2000" b="1" dirty="0"/>
               <a:t>Group 37</a:t>
             </a:r>
           </a:p>
           <a:p>
             <a:r>
-              <a:rPr lang="en-US" sz="2000" dirty="0" smtClean="0"/>
+              <a:rPr lang="en-US" sz="2000" dirty="0"/>
               <a:t>Nick Milton</a:t>
             </a:r>
           </a:p>
           <a:p>
             <a:r>
-              <a:rPr lang="en-US" sz="2000" dirty="0" smtClean="0"/>
+              <a:rPr lang="en-US" sz="2000" dirty="0"/>
               <a:t>Stephanie Reed</a:t>
             </a:r>
           </a:p>
           <a:p>
             <a:r>
-              <a:rPr lang="en-US" sz="2000" dirty="0" smtClean="0"/>
+              <a:rPr lang="en-US" sz="2000" dirty="0"/>
               <a:t>Simon Chen</a:t>
             </a:r>
           </a:p>
           <a:p>
             <a:r>
-              <a:rPr lang="en-US" sz="2000" dirty="0" smtClean="0"/>
+              <a:rPr lang="en-US" sz="2000" dirty="0"/>
               <a:t>Adam Shu</a:t>
             </a:r>
           </a:p>
           <a:p>
             <a:r>
-              <a:rPr lang="en-US" sz="2000" dirty="0" smtClean="0"/>
+              <a:rPr lang="en-US" sz="2000" dirty="0"/>
               <a:t>Sean </a:t>
             </a:r>
             <a:r>
-              <a:rPr lang="en-US" sz="2000" dirty="0" err="1" smtClean="0"/>
+              <a:rPr lang="en-US" sz="2000" dirty="0" err="1"/>
               <a:t>Miyaoka</a:t>
             </a:r>
             <a:endParaRPr lang="en-US" sz="2000" dirty="0"/>
@@ -7073,10 +7060,9 @@
           </a:lstStyle>
           <a:p>
             <a:r>
-              <a:rPr lang="en-US" sz="8000" dirty="0" smtClean="0"/>
+              <a:rPr lang="en-US" sz="8000" dirty="0"/>
               <a:t>Questions?</a:t>
             </a:r>
-            <a:endParaRPr lang="en-US" sz="8000" dirty="0"/>
           </a:p>
         </p:txBody>
       </p:sp>
@@ -7133,12 +7119,8 @@
           <a:lstStyle/>
           <a:p>
             <a:r>
-              <a:rPr lang="en-US" dirty="0" smtClean="0"/>
-              <a:t>Primary Target User: </a:t>
-            </a:r>
-            <a:r>
               <a:rPr lang="en-US" dirty="0"/>
-              <a:t>Elementary School Children</a:t>
+              <a:t>Primary Target User: Elementary School Children</a:t>
             </a:r>
             <a:br>
               <a:rPr lang="en-US" dirty="0"/>
@@ -7165,49 +7147,49 @@
           <a:lstStyle/>
           <a:p>
             <a:r>
-              <a:rPr lang="en-US" sz="3200" dirty="0" smtClean="0"/>
+              <a:rPr lang="en-US" sz="3200" dirty="0"/>
               <a:t>Accessibility</a:t>
             </a:r>
           </a:p>
           <a:p>
             <a:pPr lvl="1"/>
             <a:r>
-              <a:rPr lang="en-US" sz="2800" dirty="0" smtClean="0"/>
+              <a:rPr lang="en-US" sz="2800" dirty="0"/>
               <a:t>Using parent’s smartphone or touchpad</a:t>
             </a:r>
           </a:p>
           <a:p>
             <a:pPr lvl="1"/>
             <a:r>
-              <a:rPr lang="en-US" sz="2800" dirty="0" smtClean="0"/>
+              <a:rPr lang="en-US" sz="2800" dirty="0"/>
               <a:t>Will have small hands and device will be heavy to them</a:t>
             </a:r>
           </a:p>
           <a:p>
             <a:pPr lvl="2"/>
             <a:r>
-              <a:rPr lang="en-US" sz="2400" dirty="0" smtClean="0"/>
+              <a:rPr lang="en-US" sz="2400" dirty="0"/>
               <a:t>May hold with one hand and touch with the other</a:t>
             </a:r>
           </a:p>
           <a:p>
             <a:pPr lvl="2"/>
             <a:r>
-              <a:rPr lang="en-US" sz="2400" dirty="0" smtClean="0"/>
+              <a:rPr lang="en-US" sz="2400" dirty="0"/>
               <a:t>May use a smartphone in two hands</a:t>
             </a:r>
           </a:p>
           <a:p>
             <a:pPr lvl="1"/>
             <a:r>
-              <a:rPr lang="en-US" sz="2800" dirty="0" smtClean="0"/>
+              <a:rPr lang="en-US" sz="2800" dirty="0"/>
               <a:t>Drawn to graphics rather than excessive text content</a:t>
             </a:r>
           </a:p>
           <a:p>
             <a:pPr lvl="1"/>
             <a:r>
-              <a:rPr lang="en-US" sz="2800" dirty="0" smtClean="0"/>
+              <a:rPr lang="en-US" sz="2800" dirty="0"/>
               <a:t>Lots of free time</a:t>
             </a:r>
           </a:p>
@@ -7343,45 +7325,44 @@
           <a:lstStyle/>
           <a:p>
             <a:r>
-              <a:rPr lang="en-US" sz="2800" dirty="0" smtClean="0"/>
+              <a:rPr lang="en-US" sz="2800" dirty="0"/>
               <a:t>Habits/Characteristics</a:t>
             </a:r>
           </a:p>
           <a:p>
             <a:pPr lvl="1"/>
             <a:r>
-              <a:rPr lang="en-US" sz="2800" dirty="0" smtClean="0"/>
+              <a:rPr lang="en-US" sz="2800" dirty="0"/>
               <a:t>Will mostly play games or watch videos</a:t>
             </a:r>
           </a:p>
           <a:p>
             <a:pPr lvl="1"/>
             <a:r>
-              <a:rPr lang="en-US" sz="2800" dirty="0" smtClean="0"/>
+              <a:rPr lang="en-US" sz="2800" dirty="0"/>
               <a:t>Learns quickly and highly susceptible to messages</a:t>
             </a:r>
           </a:p>
           <a:p>
             <a:pPr lvl="1"/>
             <a:r>
-              <a:rPr lang="en-US" sz="2800" dirty="0" smtClean="0"/>
+              <a:rPr lang="en-US" sz="2800" dirty="0"/>
               <a:t>Will nag parents if they want something</a:t>
             </a:r>
           </a:p>
           <a:p>
             <a:pPr lvl="1"/>
             <a:r>
-              <a:rPr lang="en-US" sz="2800" dirty="0" smtClean="0"/>
+              <a:rPr lang="en-US" sz="2800" dirty="0"/>
               <a:t>Ages 6 to 8 will take messages literally</a:t>
             </a:r>
           </a:p>
           <a:p>
             <a:pPr lvl="1"/>
             <a:r>
-              <a:rPr lang="en-US" sz="2800" dirty="0" smtClean="0"/>
+              <a:rPr lang="en-US" sz="2800" dirty="0"/>
               <a:t>Ages 8 to 12 will have started to develop a sense of identity</a:t>
             </a:r>
-            <a:endParaRPr lang="en-US" sz="2800" dirty="0"/>
           </a:p>
         </p:txBody>
       </p:sp>
@@ -7489,10 +7470,9 @@
           <a:lstStyle/>
           <a:p>
             <a:r>
-              <a:rPr lang="en-US" dirty="0" smtClean="0"/>
+              <a:rPr lang="en-US" dirty="0"/>
               <a:t>Orientation and Layout</a:t>
             </a:r>
-            <a:endParaRPr lang="en-US" dirty="0"/>
           </a:p>
         </p:txBody>
       </p:sp>
@@ -7739,50 +7719,44 @@
           <a:p>
             <a:pPr lvl="1"/>
             <a:r>
-              <a:rPr lang="en-US" sz="2800" dirty="0" smtClean="0"/>
-              <a:t>Fixed vertical orientation</a:t>
+              <a:rPr lang="en-US" sz="2800" dirty="0"/>
+              <a:t>Fixed portrait/vertical orientation</a:t>
             </a:r>
           </a:p>
           <a:p>
             <a:pPr lvl="2"/>
             <a:r>
-              <a:rPr lang="en-US" sz="2400" dirty="0" smtClean="0"/>
-              <a:t>User doesn’t have to rotate the screen</a:t>
+              <a:rPr lang="en-US" sz="2400" dirty="0"/>
+              <a:t>Common for websites</a:t>
             </a:r>
           </a:p>
           <a:p>
             <a:pPr lvl="2"/>
             <a:r>
-              <a:rPr lang="en-US" sz="2400" dirty="0" smtClean="0"/>
-              <a:t>Game controls fit the bottom third of the screen</a:t>
+              <a:rPr lang="en-US" sz="2400" dirty="0"/>
+              <a:t>Game controls on the bottom third of the screen</a:t>
             </a:r>
           </a:p>
           <a:p>
             <a:pPr lvl="1"/>
             <a:r>
-              <a:rPr lang="en-US" sz="2800" dirty="0" smtClean="0"/>
+              <a:rPr lang="en-US" sz="2800" dirty="0"/>
               <a:t>No page scrolling</a:t>
             </a:r>
           </a:p>
           <a:p>
             <a:pPr lvl="1"/>
             <a:r>
-              <a:rPr lang="en-US" sz="2800" dirty="0" smtClean="0"/>
+              <a:rPr lang="en-US" sz="2800" dirty="0"/>
+              <a:t>No page zooming</a:t>
+            </a:r>
+          </a:p>
+          <a:p>
+            <a:pPr lvl="1"/>
+            <a:r>
+              <a:rPr lang="en-US" sz="2800" dirty="0"/>
               <a:t>Scale the content to fit the window</a:t>
             </a:r>
-          </a:p>
-          <a:p>
-            <a:pPr lvl="1"/>
-            <a:r>
-              <a:rPr lang="en-US" sz="2800" dirty="0" smtClean="0"/>
-              <a:t>Rotation locked </a:t>
-            </a:r>
-          </a:p>
-          <a:p>
-            <a:pPr marL="128016" lvl="1" indent="0">
-              <a:buNone/>
-            </a:pPr>
-            <a:endParaRPr lang="en-US" sz="2800" dirty="0"/>
           </a:p>
         </p:txBody>
       </p:sp>
@@ -7889,10 +7863,9 @@
           <a:lstStyle/>
           <a:p>
             <a:r>
-              <a:rPr lang="en-US" dirty="0" smtClean="0"/>
+              <a:rPr lang="en-US" dirty="0"/>
               <a:t>Color Scheme</a:t>
             </a:r>
-            <a:endParaRPr lang="en-US" dirty="0"/>
           </a:p>
         </p:txBody>
       </p:sp>
@@ -8196,24 +8169,24 @@
           <a:p>
             <a:pPr lvl="1"/>
             <a:r>
-              <a:rPr lang="en-US" sz="2800" dirty="0" smtClean="0"/>
+              <a:rPr lang="en-US" sz="2800" dirty="0"/>
               <a:t>Color scheme is softer and balanced</a:t>
             </a:r>
           </a:p>
           <a:p>
             <a:pPr lvl="1"/>
             <a:r>
-              <a:rPr lang="en-US" sz="2800" dirty="0" smtClean="0"/>
+              <a:rPr lang="en-US" sz="2800" dirty="0"/>
               <a:t>Includes greens that can be associated with vegetables and nature</a:t>
             </a:r>
           </a:p>
           <a:p>
             <a:pPr lvl="1"/>
-            <a:endParaRPr lang="en-US" sz="2800" dirty="0" smtClean="0"/>
+            <a:endParaRPr lang="en-US" sz="2800" dirty="0"/>
           </a:p>
           <a:p>
             <a:pPr lvl="1"/>
-            <a:endParaRPr lang="en-US" sz="2800" dirty="0" smtClean="0"/>
+            <a:endParaRPr lang="en-US" sz="2800" dirty="0"/>
           </a:p>
         </p:txBody>
       </p:sp>
@@ -8263,10 +8236,9 @@
           <a:lstStyle/>
           <a:p>
             <a:r>
-              <a:rPr lang="en-US" dirty="0" smtClean="0"/>
+              <a:rPr lang="en-US" dirty="0"/>
               <a:t>Controls and Navigation</a:t>
             </a:r>
-            <a:endParaRPr lang="en-US" dirty="0"/>
           </a:p>
         </p:txBody>
       </p:sp>
@@ -8289,46 +8261,38 @@
           <a:p>
             <a:pPr lvl="1"/>
             <a:r>
-              <a:rPr lang="en-US" sz="2800" dirty="0" smtClean="0"/>
-              <a:t>Fewer and larger </a:t>
-            </a:r>
-            <a:r>
               <a:rPr lang="en-US" sz="2800" dirty="0"/>
-              <a:t>buttons for target </a:t>
-            </a:r>
-            <a:r>
-              <a:rPr lang="en-US" sz="2800" dirty="0" smtClean="0"/>
-              <a:t>audience (at least thumb size)</a:t>
+              <a:t>Fewer and larger buttons for target audience (at least thumb size)</a:t>
             </a:r>
           </a:p>
           <a:p>
             <a:pPr lvl="1"/>
             <a:r>
-              <a:rPr lang="en-US" sz="2800" dirty="0" smtClean="0"/>
+              <a:rPr lang="en-US" sz="2800" dirty="0"/>
               <a:t>Every screen will have way to exit to the main menu</a:t>
             </a:r>
           </a:p>
           <a:p>
             <a:pPr lvl="1"/>
             <a:r>
-              <a:rPr lang="en-US" sz="2800" dirty="0" smtClean="0"/>
+              <a:rPr lang="en-US" sz="2800" dirty="0"/>
               <a:t>Pause and player messages will be overlaid Battle screen</a:t>
             </a:r>
           </a:p>
           <a:p>
             <a:pPr lvl="1"/>
             <a:r>
-              <a:rPr lang="en-US" sz="2800" dirty="0" smtClean="0"/>
+              <a:rPr lang="en-US" sz="2800" dirty="0"/>
               <a:t>Starting gameplay from the Welcome screen is 3 clicks </a:t>
             </a:r>
           </a:p>
           <a:p>
             <a:pPr lvl="1"/>
-            <a:endParaRPr lang="en-US" sz="2800" dirty="0" smtClean="0"/>
+            <a:endParaRPr lang="en-US" sz="2800" dirty="0"/>
           </a:p>
           <a:p>
             <a:pPr lvl="1"/>
-            <a:endParaRPr lang="en-US" sz="2800" dirty="0" smtClean="0"/>
+            <a:endParaRPr lang="en-US" sz="2800" dirty="0"/>
           </a:p>
         </p:txBody>
       </p:sp>
@@ -8376,6 +8340,14 @@
 <file path=ppt/slides/slide7.xml><?xml version="1.0" encoding="utf-8"?>
 <p:sld xmlns:a="http://schemas.openxmlformats.org/drawingml/2006/main" xmlns:r="http://schemas.openxmlformats.org/officeDocument/2006/relationships" xmlns:p="http://schemas.openxmlformats.org/presentationml/2006/main">
   <p:cSld>
+    <p:bg>
+      <p:bgPr>
+        <a:solidFill>
+          <a:schemeClr val="bg1"/>
+        </a:solidFill>
+        <a:effectLst/>
+      </p:bgPr>
+    </p:bg>
     <p:spTree>
       <p:nvGrpSpPr>
         <p:cNvPr id="1" name=""/>
@@ -8400,16 +8372,23 @@
             <p:ph type="title"/>
           </p:nvPr>
         </p:nvSpPr>
-        <p:spPr/>
+        <p:spPr>
+          <a:xfrm>
+            <a:off x="119253" y="542544"/>
+            <a:ext cx="9720072" cy="1499616"/>
+          </a:xfrm>
+          <a:solidFill>
+            <a:schemeClr val="bg1"/>
+          </a:solidFill>
+        </p:spPr>
         <p:txBody>
           <a:bodyPr/>
           <a:lstStyle/>
           <a:p>
             <a:r>
-              <a:rPr lang="en-US" dirty="0" smtClean="0"/>
-              <a:t>Site Map</a:t>
-            </a:r>
-            <a:endParaRPr lang="en-US" dirty="0"/>
+              <a:rPr lang="en-US" dirty="0"/>
+              <a:t>Screen Flow</a:t>
+            </a:r>
           </a:p>
         </p:txBody>
       </p:sp>
@@ -8463,8 +8442,8 @@
         </p:blipFill>
         <p:spPr>
           <a:xfrm>
-            <a:off x="2336746" y="1690322"/>
-            <a:ext cx="7112054" cy="4499463"/>
+            <a:off x="2867025" y="542544"/>
+            <a:ext cx="8677275" cy="5489705"/>
           </a:xfrm>
           <a:prstGeom prst="rect">
             <a:avLst/>
@@ -8493,7 +8472,7 @@
         </p:blipFill>
         <p:spPr>
           <a:xfrm>
-            <a:off x="7756684" y="9144"/>
+            <a:off x="9035166" y="147322"/>
             <a:ext cx="2290059" cy="2290059"/>
           </a:xfrm>
           <a:prstGeom prst="rect">
@@ -8511,13 +8490,6 @@
   <p:clrMapOvr>
     <a:masterClrMapping/>
   </p:clrMapOvr>
-  <p:timing>
-    <p:tnLst>
-      <p:par>
-        <p:cTn id="1" dur="indefinite" restart="never" nodeType="tmRoot"/>
-      </p:par>
-    </p:tnLst>
-  </p:timing>
 </p:sld>
 </file>
 
@@ -8554,11 +8526,11 @@
           <a:lstStyle/>
           <a:p>
             <a:r>
-              <a:rPr lang="en-US" dirty="0" smtClean="0"/>
+              <a:rPr lang="en-US" dirty="0"/>
               <a:t>Wireframe </a:t>
             </a:r>
             <a:r>
-              <a:rPr lang="en-US" sz="3600" dirty="0" smtClean="0"/>
+              <a:rPr lang="en-US" sz="3600" dirty="0"/>
               <a:t>– Start and Home screens</a:t>
             </a:r>
             <a:endParaRPr lang="en-US" dirty="0"/>
@@ -8680,13 +8652,6 @@
   <p:clrMapOvr>
     <a:masterClrMapping/>
   </p:clrMapOvr>
-  <p:timing>
-    <p:tnLst>
-      <p:par>
-        <p:cTn id="1" dur="indefinite" restart="never" nodeType="tmRoot"/>
-      </p:par>
-    </p:tnLst>
-  </p:timing>
 </p:sld>
 </file>
 
@@ -8723,14 +8688,13 @@
           <a:lstStyle/>
           <a:p>
             <a:r>
-              <a:rPr lang="en-US" dirty="0" smtClean="0"/>
+              <a:rPr lang="en-US" dirty="0"/>
               <a:t>Wireframe – </a:t>
             </a:r>
             <a:r>
-              <a:rPr lang="en-US" sz="3600" dirty="0" smtClean="0"/>
+              <a:rPr lang="en-US" sz="3600" dirty="0"/>
               <a:t>Login/Registration overlay, Character Select</a:t>
             </a:r>
-            <a:endParaRPr lang="en-US" sz="3600" dirty="0"/>
           </a:p>
         </p:txBody>
       </p:sp>
@@ -8820,13 +8784,6 @@
   <p:clrMapOvr>
     <a:masterClrMapping/>
   </p:clrMapOvr>
-  <p:timing>
-    <p:tnLst>
-      <p:par>
-        <p:cTn id="1" dur="indefinite" restart="never" nodeType="tmRoot"/>
-      </p:par>
-    </p:tnLst>
-  </p:timing>
 </p:sld>
 </file>
 

</xml_diff>